<commit_message>
Upando alterações tela da dashboard - JAVA SWING
</commit_message>
<xml_diff>
--- a/Documentação/Prototipos de tela/Todos/Protótipo de Tela.pptx
+++ b/Documentação/Prototipos de tela/Todos/Protótipo de Tela.pptx
@@ -117,6 +117,35 @@
     </p:ext>
   </p:extLst>
 </p:presentation>
+</file>
+
+<file path=ppt/changesInfos/changesInfo1.xml><?xml version="1.0" encoding="utf-8"?>
+<pc:chgInfo xmlns:a="http://schemas.openxmlformats.org/drawingml/2006/main" xmlns:r="http://schemas.openxmlformats.org/officeDocument/2006/relationships" xmlns:ac="http://schemas.microsoft.com/office/drawing/2013/main/command" xmlns:pc="http://schemas.microsoft.com/office/powerpoint/2013/main/command">
+  <pc:docChgLst>
+    <pc:chgData name="Isabella" userId="fe0713f97eca5c34" providerId="LiveId" clId="{7AAE96E0-3B47-44C2-AF94-CF0DE9D8A770}"/>
+    <pc:docChg chg="modSld">
+      <pc:chgData name="Isabella" userId="fe0713f97eca5c34" providerId="LiveId" clId="{7AAE96E0-3B47-44C2-AF94-CF0DE9D8A770}" dt="2020-10-23T20:44:06.396" v="2" actId="14100"/>
+      <pc:docMkLst>
+        <pc:docMk/>
+      </pc:docMkLst>
+      <pc:sldChg chg="modSp mod">
+        <pc:chgData name="Isabella" userId="fe0713f97eca5c34" providerId="LiveId" clId="{7AAE96E0-3B47-44C2-AF94-CF0DE9D8A770}" dt="2020-10-23T20:44:06.396" v="2" actId="14100"/>
+        <pc:sldMkLst>
+          <pc:docMk/>
+          <pc:sldMk cId="4158269047" sldId="265"/>
+        </pc:sldMkLst>
+        <pc:picChg chg="mod">
+          <ac:chgData name="Isabella" userId="fe0713f97eca5c34" providerId="LiveId" clId="{7AAE96E0-3B47-44C2-AF94-CF0DE9D8A770}" dt="2020-10-23T20:44:06.396" v="2" actId="14100"/>
+          <ac:picMkLst>
+            <pc:docMk/>
+            <pc:sldMk cId="4158269047" sldId="265"/>
+            <ac:picMk id="3" creationId="{A8D11E7F-49EE-4311-A3BE-BEE26805E794}"/>
+          </ac:picMkLst>
+        </pc:picChg>
+      </pc:sldChg>
+    </pc:docChg>
+  </pc:docChgLst>
+</pc:chgInfo>
 </file>
 
 <file path=ppt/slideLayouts/slideLayout1.xml><?xml version="1.0" encoding="utf-8"?>
@@ -3875,8 +3904,8 @@
         </p:blipFill>
         <p:spPr>
           <a:xfrm>
-            <a:off x="2990850" y="1223962"/>
-            <a:ext cx="6210300" cy="4410075"/>
+            <a:off x="1159813" y="0"/>
+            <a:ext cx="9657486" cy="6858000"/>
           </a:xfrm>
           <a:prstGeom prst="rect">
             <a:avLst/>

</xml_diff>